<commit_message>
Implement UI overhaul and improve user flow
- Add gradient background and styled header
- Create new heading with gradient text
- Implement drag-and-drop file upload area
- Add toggle buttons for description type selection
- Implement upload progress bar
- Add "Start Over" functionality
- Improve error handling and display
- Restructure main component for clearer process flow
- Enhance overall styling and user experience
</commit_message>
<xml_diff>
--- a/uploads/Test.pptx
+++ b/uploads/Test.pptx
@@ -338,7 +338,7 @@
             <a:fld id="{A98DE83A-E7CB-4D31-B7A9-75334010FE16}" type="datetimeFigureOut">
               <a:rPr lang="en-US" altLang="en-US"/>
               <a:pPr/>
-              <a:t>5/25/2024</a:t>
+              <a:t>8/6/2024</a:t>
             </a:fld>
             <a:endParaRPr lang="en-US" altLang="en-US"/>
           </a:p>
@@ -550,7 +550,7 @@
             <a:fld id="{66B55663-6CDA-499E-9AB1-4B84971E9982}" type="datetimeFigureOut">
               <a:rPr lang="en-US" altLang="en-US"/>
               <a:pPr/>
-              <a:t>5/25/2024</a:t>
+              <a:t>8/6/2024</a:t>
             </a:fld>
             <a:endParaRPr lang="en-US" altLang="en-US"/>
           </a:p>
@@ -795,7 +795,7 @@
             <a:fld id="{CCAFADBE-E95A-4EAC-8BA6-DD98E50A71A0}" type="datetimeFigureOut">
               <a:rPr lang="en-US" altLang="en-US"/>
               <a:pPr/>
-              <a:t>5/25/2024</a:t>
+              <a:t>8/6/2024</a:t>
             </a:fld>
             <a:endParaRPr lang="en-US" altLang="en-US"/>
           </a:p>
@@ -978,7 +978,7 @@
             <a:fld id="{BBB3A5A1-6B8F-4A66-A60B-397E38A19570}" type="datetimeFigureOut">
               <a:rPr lang="en-US" altLang="en-US"/>
               <a:pPr/>
-              <a:t>5/25/2024</a:t>
+              <a:t>8/6/2024</a:t>
             </a:fld>
             <a:endParaRPr lang="en-US" altLang="en-US"/>
           </a:p>
@@ -1132,7 +1132,7 @@
             <a:fld id="{EA5CC432-5AAD-41F3-823E-BA22016E5525}" type="datetimeFigureOut">
               <a:rPr lang="en-US" altLang="en-US"/>
               <a:pPr/>
-              <a:t>5/25/2024</a:t>
+              <a:t>8/6/2024</a:t>
             </a:fld>
             <a:endParaRPr lang="en-US" altLang="en-US"/>
           </a:p>
@@ -2410,7 +2410,7 @@
             <a:fld id="{1606525E-D638-402D-BC60-7FC06814D07A}" type="datetimeFigureOut">
               <a:rPr lang="en-US" altLang="en-US"/>
               <a:pPr/>
-              <a:t>5/25/2024</a:t>
+              <a:t>8/6/2024</a:t>
             </a:fld>
             <a:endParaRPr lang="en-US" altLang="en-US"/>
           </a:p>
@@ -14933,7 +14933,7 @@
         <p:spPr>
           <a:xfrm>
             <a:off x="742950" y="1468438"/>
-            <a:ext cx="7758113" cy="4244975"/>
+            <a:ext cx="7758113" cy="4628190"/>
           </a:xfrm>
           <a:prstGeom prst="rect">
             <a:avLst/>
@@ -15080,7 +15080,7 @@
               <a:buChar char="•"/>
             </a:pPr>
             <a:r>
-              <a:rPr lang="en-US" altLang="en-US" sz="2600">
+              <a:rPr lang="en-US" altLang="en-US" sz="2600" dirty="0">
                 <a:solidFill>
                   <a:srgbClr val="585858"/>
                 </a:solidFill>
@@ -15090,7 +15090,7 @@
               </a:rPr>
               <a:t>The research method / methodology:</a:t>
             </a:r>
-            <a:endParaRPr lang="en-US" altLang="en-US" sz="2600">
+            <a:endParaRPr lang="en-US" altLang="en-US" sz="2600" dirty="0">
               <a:solidFill>
                 <a:srgbClr val="000000"/>
               </a:solidFill>
@@ -15114,7 +15114,7 @@
               <a:buChar char="–"/>
             </a:pPr>
             <a:r>
-              <a:rPr lang="en-US" altLang="en-US" sz="2200">
+              <a:rPr lang="en-US" altLang="en-US" sz="2200" dirty="0">
                 <a:solidFill>
                   <a:srgbClr val="585858"/>
                 </a:solidFill>
@@ -15125,7 +15125,7 @@
               <a:t>A description of </a:t>
             </a:r>
             <a:r>
-              <a:rPr lang="en-US" altLang="en-US" sz="2200" i="1">
+              <a:rPr lang="en-US" altLang="en-US" sz="2200" i="1" dirty="0">
                 <a:solidFill>
                   <a:srgbClr val="585858"/>
                 </a:solidFill>
@@ -15136,7 +15136,7 @@
               <a:t>how </a:t>
             </a:r>
             <a:r>
-              <a:rPr lang="en-US" altLang="en-US" sz="2200">
+              <a:rPr lang="en-US" altLang="en-US" sz="2200" dirty="0">
                 <a:solidFill>
                   <a:srgbClr val="585858"/>
                 </a:solidFill>
@@ -15147,7 +15147,7 @@
               <a:t>you obtained results, i.e. </a:t>
             </a:r>
             <a:r>
-              <a:rPr lang="en-US" altLang="en-US" sz="2200" i="1">
+              <a:rPr lang="en-US" altLang="en-US" sz="2200" i="1" dirty="0">
                 <a:solidFill>
                   <a:srgbClr val="585858"/>
                 </a:solidFill>
@@ -15158,7 +15158,7 @@
               <a:t>what </a:t>
             </a:r>
             <a:r>
-              <a:rPr lang="en-US" altLang="en-US" sz="2200">
+              <a:rPr lang="en-US" altLang="en-US" sz="2200" dirty="0">
                 <a:solidFill>
                   <a:srgbClr val="585858"/>
                 </a:solidFill>
@@ -15168,7 +15168,7 @@
               </a:rPr>
               <a:t>you did to reach your conclusions</a:t>
             </a:r>
-            <a:endParaRPr lang="en-US" altLang="en-US" sz="2200">
+            <a:endParaRPr lang="en-US" altLang="en-US" sz="2200" dirty="0">
               <a:solidFill>
                 <a:srgbClr val="000000"/>
               </a:solidFill>
@@ -15189,7 +15189,7 @@
               <a:buChar char="–"/>
             </a:pPr>
             <a:r>
-              <a:rPr lang="en-US" altLang="en-US" sz="2200">
+              <a:rPr lang="en-US" altLang="en-US" sz="2200" dirty="0">
                 <a:solidFill>
                   <a:srgbClr val="585858"/>
                 </a:solidFill>
@@ -15199,7 +15199,7 @@
               </a:rPr>
               <a:t>Convinces the reader of the validity of your conclusions</a:t>
             </a:r>
-            <a:endParaRPr lang="en-US" altLang="en-US" sz="2200">
+            <a:endParaRPr lang="en-US" altLang="en-US" sz="2200" dirty="0">
               <a:solidFill>
                 <a:srgbClr val="000000"/>
               </a:solidFill>
@@ -15220,7 +15220,7 @@
               <a:buChar char="•"/>
             </a:pPr>
             <a:r>
-              <a:rPr lang="en-US" altLang="en-US" sz="2600">
+              <a:rPr lang="en-US" altLang="en-US" sz="2600" dirty="0">
                 <a:solidFill>
                   <a:srgbClr val="585858"/>
                 </a:solidFill>
@@ -15230,7 +15230,7 @@
               </a:rPr>
               <a:t>Proposal stage:</a:t>
             </a:r>
-            <a:endParaRPr lang="en-US" altLang="en-US" sz="2600">
+            <a:endParaRPr lang="en-US" altLang="en-US" sz="2600" dirty="0">
               <a:solidFill>
                 <a:srgbClr val="000000"/>
               </a:solidFill>
@@ -15254,7 +15254,7 @@
               <a:buChar char="–"/>
             </a:pPr>
             <a:r>
-              <a:rPr lang="en-US" altLang="en-US" sz="2200">
+              <a:rPr lang="en-US" altLang="en-US" sz="2200" dirty="0">
                 <a:solidFill>
                   <a:srgbClr val="585858"/>
                 </a:solidFill>
@@ -15264,7 +15264,7 @@
               </a:rPr>
               <a:t>Explain what method you will use and how it will be applied in your study</a:t>
             </a:r>
-            <a:endParaRPr lang="en-US" altLang="en-US" sz="2200">
+            <a:endParaRPr lang="en-US" altLang="en-US" sz="2200" dirty="0">
               <a:solidFill>
                 <a:srgbClr val="000000"/>
               </a:solidFill>
@@ -15285,7 +15285,7 @@
               <a:buChar char="–"/>
             </a:pPr>
             <a:r>
-              <a:rPr lang="en-US" altLang="en-US" sz="2200">
+              <a:rPr lang="en-US" altLang="en-US" sz="2200" dirty="0">
                 <a:solidFill>
                   <a:srgbClr val="585858"/>
                 </a:solidFill>
@@ -15295,7 +15295,7 @@
               </a:rPr>
               <a:t>Will you be collecting any data? What will you do with it?</a:t>
             </a:r>
-            <a:endParaRPr lang="en-US" altLang="en-US" sz="2200">
+            <a:endParaRPr lang="en-US" altLang="en-US" sz="2200" dirty="0">
               <a:solidFill>
                 <a:srgbClr val="000000"/>
               </a:solidFill>
@@ -15316,7 +15316,7 @@
               <a:buChar char="•"/>
             </a:pPr>
             <a:r>
-              <a:rPr lang="en-US" altLang="en-US" sz="2600">
+              <a:rPr lang="en-US" altLang="en-US" sz="2600" dirty="0">
                 <a:solidFill>
                   <a:srgbClr val="585858"/>
                 </a:solidFill>
@@ -15326,7 +15326,7 @@
               </a:rPr>
               <a:t>Final report stage:</a:t>
             </a:r>
-            <a:endParaRPr lang="en-US" altLang="en-US" sz="2600">
+            <a:endParaRPr lang="en-US" altLang="en-US" sz="2600" dirty="0">
               <a:solidFill>
                 <a:srgbClr val="000000"/>
               </a:solidFill>
@@ -15350,7 +15350,7 @@
               <a:buChar char="–"/>
             </a:pPr>
             <a:r>
-              <a:rPr lang="en-US" altLang="en-US" sz="2200">
+              <a:rPr lang="en-US" altLang="en-US" sz="2200" dirty="0">
                 <a:solidFill>
                   <a:srgbClr val="585858"/>
                 </a:solidFill>
@@ -15360,7 +15360,7 @@
               </a:rPr>
               <a:t>Report on what you actually did (i.e. tweak the description in</a:t>
             </a:r>
-            <a:endParaRPr lang="en-US" altLang="en-US" sz="2200">
+            <a:endParaRPr lang="en-US" altLang="en-US" sz="2200" dirty="0">
               <a:solidFill>
                 <a:srgbClr val="000000"/>
               </a:solidFill>
@@ -15376,7 +15376,7 @@
               </a:lnSpc>
             </a:pPr>
             <a:r>
-              <a:rPr lang="en-US" altLang="en-US" sz="2200">
+              <a:rPr lang="en-US" altLang="en-US" sz="2200" dirty="0">
                 <a:solidFill>
                   <a:srgbClr val="585858"/>
                 </a:solidFill>
@@ -15386,7 +15386,14 @@
               </a:rPr>
               <a:t>your proposal so that it accurately reflects what you did)</a:t>
             </a:r>
-            <a:endParaRPr lang="en-US" altLang="en-US" sz="2200">
+          </a:p>
+          <a:p>
+            <a:pPr eaLnBrk="1" hangingPunct="1">
+              <a:lnSpc>
+                <a:spcPts val="2513"/>
+              </a:lnSpc>
+            </a:pPr>
+            <a:endParaRPr lang="en-US" altLang="en-US" sz="2200" dirty="0">
               <a:solidFill>
                 <a:srgbClr val="000000"/>
               </a:solidFill>
@@ -22258,6 +22265,42 @@
           </a:p>
         </p:txBody>
       </p:sp>
+      <p:pic>
+        <p:nvPicPr>
+          <p:cNvPr id="4" name="Picture 3">
+            <a:extLst>
+              <a:ext uri="{FF2B5EF4-FFF2-40B4-BE49-F238E27FC236}">
+                <a16:creationId xmlns:a16="http://schemas.microsoft.com/office/drawing/2014/main" id="{15DAA88A-7BE8-58DE-967C-AF2A798888D9}"/>
+              </a:ext>
+            </a:extLst>
+          </p:cNvPr>
+          <p:cNvPicPr>
+            <a:picLocks noChangeAspect="1"/>
+          </p:cNvPicPr>
+          <p:nvPr/>
+        </p:nvPicPr>
+        <p:blipFill>
+          <a:blip r:embed="rId3">
+            <a:extLst>
+              <a:ext uri="{28A0092B-C50C-407E-A947-70E740481C1C}">
+                <a14:useLocalDpi xmlns:a14="http://schemas.microsoft.com/office/drawing/2010/main" val="0"/>
+              </a:ext>
+            </a:extLst>
+          </a:blip>
+          <a:stretch>
+            <a:fillRect/>
+          </a:stretch>
+        </p:blipFill>
+        <p:spPr>
+          <a:xfrm>
+            <a:off x="1441276" y="5047839"/>
+            <a:ext cx="3956400" cy="1794286"/>
+          </a:xfrm>
+          <a:prstGeom prst="rect">
+            <a:avLst/>
+          </a:prstGeom>
+        </p:spPr>
+      </p:pic>
     </p:spTree>
   </p:cSld>
   <p:clrMapOvr>
@@ -26228,7 +26271,7 @@
               </a:rPr>
               <a:t>Science</a:t>
             </a:r>
-            <a:endParaRPr sz="2000" kern="0">
+            <a:endParaRPr sz="2000" kern="0" dirty="0">
               <a:solidFill>
                 <a:sysClr val="windowText" lastClr="000000"/>
               </a:solidFill>
@@ -26385,7 +26428,7 @@
               </a:rPr>
               <a:t>are:</a:t>
             </a:r>
-            <a:endParaRPr sz="2000" kern="0">
+            <a:endParaRPr sz="2000" kern="0" dirty="0">
               <a:solidFill>
                 <a:sysClr val="windowText" lastClr="000000"/>
               </a:solidFill>
@@ -26441,7 +26484,7 @@
               </a:rPr>
               <a:t>Surveys</a:t>
             </a:r>
-            <a:endParaRPr kern="0">
+            <a:endParaRPr kern="0" dirty="0">
               <a:solidFill>
                 <a:sysClr val="windowText" lastClr="000000"/>
               </a:solidFill>
@@ -26477,7 +26520,7 @@
               </a:rPr>
               <a:t>Models</a:t>
             </a:r>
-            <a:endParaRPr kern="0">
+            <a:endParaRPr kern="0" dirty="0">
               <a:solidFill>
                 <a:sysClr val="windowText" lastClr="000000"/>
               </a:solidFill>
@@ -26513,7 +26556,7 @@
               </a:rPr>
               <a:t>Languages</a:t>
             </a:r>
-            <a:endParaRPr kern="0">
+            <a:endParaRPr kern="0" dirty="0">
               <a:solidFill>
                 <a:sysClr val="windowText" lastClr="000000"/>
               </a:solidFill>
@@ -26549,7 +26592,7 @@
               </a:rPr>
               <a:t>Prototypes</a:t>
             </a:r>
-            <a:endParaRPr kern="0">
+            <a:endParaRPr kern="0" dirty="0">
               <a:solidFill>
                 <a:sysClr val="windowText" lastClr="000000"/>
               </a:solidFill>
@@ -26585,7 +26628,7 @@
               </a:rPr>
               <a:t>Algorithms</a:t>
             </a:r>
-            <a:endParaRPr kern="0">
+            <a:endParaRPr kern="0" dirty="0">
               <a:solidFill>
                 <a:sysClr val="windowText" lastClr="000000"/>
               </a:solidFill>
@@ -26641,7 +26684,7 @@
               </a:rPr>
               <a:t>proofs</a:t>
             </a:r>
-            <a:endParaRPr kern="0">
+            <a:endParaRPr kern="0" dirty="0">
               <a:solidFill>
                 <a:sysClr val="windowText" lastClr="000000"/>
               </a:solidFill>
@@ -26707,7 +26750,7 @@
               </a:rPr>
               <a:t> Evaluations</a:t>
             </a:r>
-            <a:endParaRPr kern="0">
+            <a:endParaRPr kern="0" dirty="0">
               <a:solidFill>
                 <a:sysClr val="windowText" lastClr="000000"/>
               </a:solidFill>
@@ -26763,7 +26806,7 @@
               </a:rPr>
               <a:t>Studies</a:t>
             </a:r>
-            <a:endParaRPr kern="0">
+            <a:endParaRPr kern="0" dirty="0">
               <a:solidFill>
                 <a:sysClr val="windowText" lastClr="000000"/>
               </a:solidFill>
@@ -26799,7 +26842,7 @@
               </a:rPr>
               <a:t>Arguments</a:t>
             </a:r>
-            <a:endParaRPr kern="0">
+            <a:endParaRPr kern="0" dirty="0">
               <a:solidFill>
                 <a:sysClr val="windowText" lastClr="000000"/>
               </a:solidFill>
@@ -27016,7 +27059,7 @@
               </a:rPr>
               <a:t>approaches</a:t>
             </a:r>
-            <a:endParaRPr sz="2000" kern="0">
+            <a:endParaRPr sz="2000" kern="0" dirty="0">
               <a:solidFill>
                 <a:sysClr val="windowText" lastClr="000000"/>
               </a:solidFill>
@@ -27055,7 +27098,7 @@
         </p:blipFill>
         <p:spPr bwMode="auto">
           <a:xfrm>
-            <a:off x="6372225" y="3068638"/>
+            <a:off x="6381903" y="3104025"/>
             <a:ext cx="1952625" cy="2343150"/>
           </a:xfrm>
           <a:prstGeom prst="rect">
@@ -27084,6 +27127,42 @@
               </a14:hiddenLine>
             </a:ext>
           </a:extLst>
+        </p:spPr>
+      </p:pic>
+      <p:pic>
+        <p:nvPicPr>
+          <p:cNvPr id="4" name="Picture 3">
+            <a:extLst>
+              <a:ext uri="{FF2B5EF4-FFF2-40B4-BE49-F238E27FC236}">
+                <a16:creationId xmlns:a16="http://schemas.microsoft.com/office/drawing/2014/main" id="{2116B47D-F7A5-BD87-9FDE-C50560638570}"/>
+              </a:ext>
+            </a:extLst>
+          </p:cNvPr>
+          <p:cNvPicPr>
+            <a:picLocks noChangeAspect="1"/>
+          </p:cNvPicPr>
+          <p:nvPr/>
+        </p:nvPicPr>
+        <p:blipFill>
+          <a:blip r:embed="rId3">
+            <a:extLst>
+              <a:ext uri="{28A0092B-C50C-407E-A947-70E740481C1C}">
+                <a14:useLocalDpi xmlns:a14="http://schemas.microsoft.com/office/drawing/2010/main" val="0"/>
+              </a:ext>
+            </a:extLst>
+          </a:blip>
+          <a:stretch>
+            <a:fillRect/>
+          </a:stretch>
+        </p:blipFill>
+        <p:spPr>
+          <a:xfrm>
+            <a:off x="4724400" y="3108941"/>
+            <a:ext cx="1388877" cy="1903276"/>
+          </a:xfrm>
+          <a:prstGeom prst="rect">
+            <a:avLst/>
+          </a:prstGeom>
         </p:spPr>
       </p:pic>
     </p:spTree>

</xml_diff>